<commit_message>
Fixing hyphenation on "best practices" per @jurph
</commit_message>
<xml_diff>
--- a/IR_Capabilities_Hierarchy.pptx
+++ b/IR_Capabilities_Hierarchy.pptx
@@ -216,7 +216,7 @@
           <a:p>
             <a:fld id="{70DE88E8-3840-4376-8E8B-8601CED3DC96}" type="datetimeFigureOut">
               <a:rPr lang="en-US" smtClean="0"/>
-              <a:t>2016-12-18</a:t>
+              <a:t>2016-12-19</a:t>
             </a:fld>
             <a:endParaRPr lang="en-US"/>
           </a:p>
@@ -381,7 +381,7 @@
           <a:p>
             <a:fld id="{7A2C4406-21BA-47BC-B6E2-409A9190037F}" type="datetimeFigureOut">
               <a:rPr lang="en-US" smtClean="0"/>
-              <a:t>2016-12-18</a:t>
+              <a:t>2016-12-19</a:t>
             </a:fld>
             <a:endParaRPr lang="en-US"/>
           </a:p>
@@ -696,7 +696,6 @@
               <a:rPr lang="en-US" dirty="0"/>
               <a:t>Shared with the community under a Creative Commons Attribution 4.0 International license: http://creativecommons.org/licenses/by/4.0/</a:t>
             </a:r>
-            <a:endParaRPr lang="en-US" dirty="0"/>
           </a:p>
           <a:p>
             <a:r>
@@ -1102,7 +1101,7 @@
           <a:p>
             <a:fld id="{9A7EBDF7-7E69-4863-AEF7-ACEAA508A247}" type="datetimeFigureOut">
               <a:rPr lang="en-US" smtClean="0"/>
-              <a:t>2016-12-18</a:t>
+              <a:t>2016-12-19</a:t>
             </a:fld>
             <a:endParaRPr lang="en-US"/>
           </a:p>
@@ -1270,7 +1269,7 @@
           <a:p>
             <a:fld id="{9A7EBDF7-7E69-4863-AEF7-ACEAA508A247}" type="datetimeFigureOut">
               <a:rPr lang="en-US" smtClean="0"/>
-              <a:t>2016-12-18</a:t>
+              <a:t>2016-12-19</a:t>
             </a:fld>
             <a:endParaRPr lang="en-US"/>
           </a:p>
@@ -1448,7 +1447,7 @@
           <a:p>
             <a:fld id="{9A7EBDF7-7E69-4863-AEF7-ACEAA508A247}" type="datetimeFigureOut">
               <a:rPr lang="en-US" smtClean="0"/>
-              <a:t>2016-12-18</a:t>
+              <a:t>2016-12-19</a:t>
             </a:fld>
             <a:endParaRPr lang="en-US"/>
           </a:p>
@@ -1807,7 +1806,7 @@
           <a:p>
             <a:fld id="{9A7EBDF7-7E69-4863-AEF7-ACEAA508A247}" type="datetimeFigureOut">
               <a:rPr lang="en-US" smtClean="0"/>
-              <a:t>2016-12-18</a:t>
+              <a:t>2016-12-19</a:t>
             </a:fld>
             <a:endParaRPr lang="en-US"/>
           </a:p>
@@ -2053,7 +2052,7 @@
           <a:p>
             <a:fld id="{9A7EBDF7-7E69-4863-AEF7-ACEAA508A247}" type="datetimeFigureOut">
               <a:rPr lang="en-US" smtClean="0"/>
-              <a:t>2016-12-18</a:t>
+              <a:t>2016-12-19</a:t>
             </a:fld>
             <a:endParaRPr lang="en-US"/>
           </a:p>
@@ -2282,7 +2281,7 @@
           <a:p>
             <a:fld id="{9A7EBDF7-7E69-4863-AEF7-ACEAA508A247}" type="datetimeFigureOut">
               <a:rPr lang="en-US" smtClean="0"/>
-              <a:t>2016-12-18</a:t>
+              <a:t>2016-12-19</a:t>
             </a:fld>
             <a:endParaRPr lang="en-US"/>
           </a:p>
@@ -2646,7 +2645,7 @@
           <a:p>
             <a:fld id="{9A7EBDF7-7E69-4863-AEF7-ACEAA508A247}" type="datetimeFigureOut">
               <a:rPr lang="en-US" smtClean="0"/>
-              <a:t>2016-12-18</a:t>
+              <a:t>2016-12-19</a:t>
             </a:fld>
             <a:endParaRPr lang="en-US"/>
           </a:p>
@@ -2763,7 +2762,7 @@
           <a:p>
             <a:fld id="{9A7EBDF7-7E69-4863-AEF7-ACEAA508A247}" type="datetimeFigureOut">
               <a:rPr lang="en-US" smtClean="0"/>
-              <a:t>2016-12-18</a:t>
+              <a:t>2016-12-19</a:t>
             </a:fld>
             <a:endParaRPr lang="en-US"/>
           </a:p>
@@ -2858,7 +2857,7 @@
           <a:p>
             <a:fld id="{9A7EBDF7-7E69-4863-AEF7-ACEAA508A247}" type="datetimeFigureOut">
               <a:rPr lang="en-US" smtClean="0"/>
-              <a:t>2016-12-18</a:t>
+              <a:t>2016-12-19</a:t>
             </a:fld>
             <a:endParaRPr lang="en-US"/>
           </a:p>
@@ -3133,7 +3132,7 @@
           <a:p>
             <a:fld id="{9A7EBDF7-7E69-4863-AEF7-ACEAA508A247}" type="datetimeFigureOut">
               <a:rPr lang="en-US" smtClean="0"/>
-              <a:t>2016-12-18</a:t>
+              <a:t>2016-12-19</a:t>
             </a:fld>
             <a:endParaRPr lang="en-US"/>
           </a:p>
@@ -3388,7 +3387,7 @@
           <a:p>
             <a:fld id="{9A7EBDF7-7E69-4863-AEF7-ACEAA508A247}" type="datetimeFigureOut">
               <a:rPr lang="en-US" smtClean="0"/>
-              <a:t>2016-12-18</a:t>
+              <a:t>2016-12-19</a:t>
             </a:fld>
             <a:endParaRPr lang="en-US"/>
           </a:p>
@@ -3600,7 +3599,7 @@
           <a:p>
             <a:fld id="{9A7EBDF7-7E69-4863-AEF7-ACEAA508A247}" type="datetimeFigureOut">
               <a:rPr lang="en-US" smtClean="0"/>
-              <a:t>2016-12-18</a:t>
+              <a:t>2016-12-19</a:t>
             </a:fld>
             <a:endParaRPr lang="en-US"/>
           </a:p>
@@ -8399,7 +8398,7 @@
               <a:rPr lang="en-US" sz="2400" dirty="0">
                 <a:latin typeface="+mj-lt"/>
               </a:rPr>
-              <a:t>“I detect hygiene issues and operator activity that does not follow best-practices.”</a:t>
+              <a:t>“I detect hygiene issues and operator activity that does not follow best practices.”</a:t>
             </a:r>
           </a:p>
         </p:txBody>

</xml_diff>